<commit_message>
Correction fautes d'orthographe + Ajout sur la conclusion
</commit_message>
<xml_diff>
--- a/Présentation/Présentation.pptx
+++ b/Présentation/Présentation.pptx
@@ -200,7 +200,7 @@
           <a:p>
             <a:fld id="{61637C5A-3DB7-4BFE-BF35-2EE2ABA6F5A5}" type="datetimeFigureOut">
               <a:rPr lang="fr-FR" smtClean="0"/>
-              <a:t>27/02/2015</a:t>
+              <a:t>01/03/2015</a:t>
             </a:fld>
             <a:endParaRPr lang="fr-FR"/>
           </a:p>
@@ -733,7 +733,7 @@
           <a:p>
             <a:fld id="{6957D51F-9418-43A3-B192-E8DEE06728D0}" type="datetimeFigureOut">
               <a:rPr lang="fr-FR" smtClean="0"/>
-              <a:t>27/02/2015</a:t>
+              <a:t>01/03/2015</a:t>
             </a:fld>
             <a:endParaRPr lang="fr-FR"/>
           </a:p>
@@ -903,7 +903,7 @@
           <a:p>
             <a:fld id="{6957D51F-9418-43A3-B192-E8DEE06728D0}" type="datetimeFigureOut">
               <a:rPr lang="fr-FR" smtClean="0"/>
-              <a:t>27/02/2015</a:t>
+              <a:t>01/03/2015</a:t>
             </a:fld>
             <a:endParaRPr lang="fr-FR"/>
           </a:p>
@@ -1083,7 +1083,7 @@
           <a:p>
             <a:fld id="{6957D51F-9418-43A3-B192-E8DEE06728D0}" type="datetimeFigureOut">
               <a:rPr lang="fr-FR" smtClean="0"/>
-              <a:t>27/02/2015</a:t>
+              <a:t>01/03/2015</a:t>
             </a:fld>
             <a:endParaRPr lang="fr-FR"/>
           </a:p>
@@ -1253,7 +1253,7 @@
           <a:p>
             <a:fld id="{6957D51F-9418-43A3-B192-E8DEE06728D0}" type="datetimeFigureOut">
               <a:rPr lang="fr-FR" smtClean="0"/>
-              <a:t>27/02/2015</a:t>
+              <a:t>01/03/2015</a:t>
             </a:fld>
             <a:endParaRPr lang="fr-FR"/>
           </a:p>
@@ -1499,7 +1499,7 @@
           <a:p>
             <a:fld id="{6957D51F-9418-43A3-B192-E8DEE06728D0}" type="datetimeFigureOut">
               <a:rPr lang="fr-FR" smtClean="0"/>
-              <a:t>27/02/2015</a:t>
+              <a:t>01/03/2015</a:t>
             </a:fld>
             <a:endParaRPr lang="fr-FR"/>
           </a:p>
@@ -1787,7 +1787,7 @@
           <a:p>
             <a:fld id="{6957D51F-9418-43A3-B192-E8DEE06728D0}" type="datetimeFigureOut">
               <a:rPr lang="fr-FR" smtClean="0"/>
-              <a:t>27/02/2015</a:t>
+              <a:t>01/03/2015</a:t>
             </a:fld>
             <a:endParaRPr lang="fr-FR"/>
           </a:p>
@@ -2209,7 +2209,7 @@
           <a:p>
             <a:fld id="{6957D51F-9418-43A3-B192-E8DEE06728D0}" type="datetimeFigureOut">
               <a:rPr lang="fr-FR" smtClean="0"/>
-              <a:t>27/02/2015</a:t>
+              <a:t>01/03/2015</a:t>
             </a:fld>
             <a:endParaRPr lang="fr-FR"/>
           </a:p>
@@ -2327,7 +2327,7 @@
           <a:p>
             <a:fld id="{6957D51F-9418-43A3-B192-E8DEE06728D0}" type="datetimeFigureOut">
               <a:rPr lang="fr-FR" smtClean="0"/>
-              <a:t>27/02/2015</a:t>
+              <a:t>01/03/2015</a:t>
             </a:fld>
             <a:endParaRPr lang="fr-FR"/>
           </a:p>
@@ -2422,7 +2422,7 @@
           <a:p>
             <a:fld id="{6957D51F-9418-43A3-B192-E8DEE06728D0}" type="datetimeFigureOut">
               <a:rPr lang="fr-FR" smtClean="0"/>
-              <a:t>27/02/2015</a:t>
+              <a:t>01/03/2015</a:t>
             </a:fld>
             <a:endParaRPr lang="fr-FR"/>
           </a:p>
@@ -2699,7 +2699,7 @@
           <a:p>
             <a:fld id="{6957D51F-9418-43A3-B192-E8DEE06728D0}" type="datetimeFigureOut">
               <a:rPr lang="fr-FR" smtClean="0"/>
-              <a:t>27/02/2015</a:t>
+              <a:t>01/03/2015</a:t>
             </a:fld>
             <a:endParaRPr lang="fr-FR"/>
           </a:p>
@@ -2952,7 +2952,7 @@
           <a:p>
             <a:fld id="{6957D51F-9418-43A3-B192-E8DEE06728D0}" type="datetimeFigureOut">
               <a:rPr lang="fr-FR" smtClean="0"/>
-              <a:t>27/02/2015</a:t>
+              <a:t>01/03/2015</a:t>
             </a:fld>
             <a:endParaRPr lang="fr-FR"/>
           </a:p>
@@ -3174,7 +3174,7 @@
           <a:p>
             <a:fld id="{6957D51F-9418-43A3-B192-E8DEE06728D0}" type="datetimeFigureOut">
               <a:rPr lang="fr-FR" smtClean="0"/>
-              <a:t>27/02/2015</a:t>
+              <a:t>01/03/2015</a:t>
             </a:fld>
             <a:endParaRPr lang="fr-FR"/>
           </a:p>
@@ -3584,16 +3584,12 @@
           <a:lstStyle/>
           <a:p>
             <a:r>
+              <a:rPr lang="fr-FR" dirty="0" smtClean="0"/>
+              <a:t>Online </a:t>
+            </a:r>
+            <a:r>
               <a:rPr lang="fr-FR" dirty="0" err="1" smtClean="0"/>
-              <a:t>Work</a:t>
-            </a:r>
-            <a:r>
-              <a:rPr lang="fr-FR" dirty="0" smtClean="0"/>
-              <a:t> </a:t>
-            </a:r>
-            <a:r>
-              <a:rPr lang="fr-FR" dirty="0" err="1" smtClean="0"/>
-              <a:t>Space</a:t>
+              <a:t>Synergy</a:t>
             </a:r>
             <a:endParaRPr lang="fr-FR" dirty="0"/>
           </a:p>
@@ -3620,12 +3616,12 @@
           <a:lstStyle/>
           <a:p>
             <a:r>
-              <a:rPr lang="fr-FR" dirty="0" err="1" smtClean="0"/>
-              <a:t>Dévelopé</a:t>
-            </a:r>
-            <a:r>
               <a:rPr lang="fr-FR" dirty="0" smtClean="0"/>
-              <a:t> par :</a:t>
+              <a:t>Développé </a:t>
+            </a:r>
+            <a:r>
+              <a:rPr lang="fr-FR" dirty="0" smtClean="0"/>
+              <a:t>par :</a:t>
             </a:r>
           </a:p>
           <a:p>
@@ -3981,9 +3977,6 @@
           <a:bodyPr/>
           <a:lstStyle/>
           <a:p>
-            <a:pPr marL="0" indent="0">
-              <a:buNone/>
-            </a:pPr>
             <a:r>
               <a:rPr lang="fr-FR" dirty="0" smtClean="0">
                 <a:solidFill>
@@ -3996,9 +3989,6 @@
             </a:r>
           </a:p>
           <a:p>
-            <a:pPr marL="0" indent="0">
-              <a:buNone/>
-            </a:pPr>
             <a:r>
               <a:rPr lang="fr-FR" dirty="0" smtClean="0">
                 <a:solidFill>
@@ -4011,9 +4001,7 @@
             </a:r>
           </a:p>
           <a:p>
-            <a:pPr marL="0" indent="0">
-              <a:buNone/>
-            </a:pPr>
+            <a:pPr lvl="1"/>
             <a:r>
               <a:rPr lang="fr-FR" dirty="0">
                 <a:solidFill>
@@ -4036,9 +4024,7 @@
             </a:r>
           </a:p>
           <a:p>
-            <a:pPr marL="0" indent="0">
-              <a:buNone/>
-            </a:pPr>
+            <a:pPr lvl="1"/>
             <a:r>
               <a:rPr lang="fr-FR" dirty="0">
                 <a:solidFill>
@@ -4061,9 +4047,7 @@
             </a:r>
           </a:p>
           <a:p>
-            <a:pPr marL="0" indent="0">
-              <a:buNone/>
-            </a:pPr>
+            <a:pPr lvl="1"/>
             <a:r>
               <a:rPr lang="fr-FR" dirty="0">
                 <a:solidFill>
@@ -4192,8 +4176,8 @@
         </p:blipFill>
         <p:spPr bwMode="auto">
           <a:xfrm>
-            <a:off x="3419872" y="1268760"/>
-            <a:ext cx="5236159" cy="2543082"/>
+            <a:off x="3851920" y="1196752"/>
+            <a:ext cx="4608512" cy="2238248"/>
           </a:xfrm>
           <a:prstGeom prst="rect">
             <a:avLst/>
@@ -4262,19 +4246,16 @@
         </p:nvSpPr>
         <p:spPr>
           <a:xfrm>
-            <a:off x="251520" y="1570182"/>
-            <a:ext cx="8229600" cy="3831635"/>
+            <a:off x="251520" y="2896343"/>
+            <a:ext cx="8424936" cy="3989041"/>
           </a:xfrm>
         </p:spPr>
         <p:txBody>
           <a:bodyPr>
-            <a:normAutofit fontScale="92500" lnSpcReduction="10000"/>
+            <a:normAutofit/>
           </a:bodyPr>
           <a:lstStyle/>
           <a:p>
-            <a:pPr marL="0" indent="0">
-              <a:buNone/>
-            </a:pPr>
             <a:r>
               <a:rPr lang="fr-FR" dirty="0" smtClean="0">
                 <a:solidFill>
@@ -4283,13 +4264,18 @@
                   </a:schemeClr>
                 </a:solidFill>
               </a:rPr>
-              <a:t>Dessin collaboratif</a:t>
-            </a:r>
-          </a:p>
-          <a:p>
-            <a:pPr marL="0" indent="0">
-              <a:buNone/>
-            </a:pPr>
+              <a:t>Dessin </a:t>
+            </a:r>
+            <a:r>
+              <a:rPr lang="fr-FR" dirty="0" smtClean="0">
+                <a:solidFill>
+                  <a:schemeClr val="bg1">
+                    <a:lumMod val="50000"/>
+                  </a:schemeClr>
+                </a:solidFill>
+              </a:rPr>
+              <a:t>collaboratif</a:t>
+            </a:r>
             <a:endParaRPr lang="fr-FR" dirty="0" smtClean="0">
               <a:solidFill>
                 <a:schemeClr val="bg1">
@@ -4299,9 +4285,6 @@
             </a:endParaRPr>
           </a:p>
           <a:p>
-            <a:pPr marL="0" indent="0">
-              <a:buNone/>
-            </a:pPr>
             <a:r>
               <a:rPr lang="fr-FR" dirty="0" smtClean="0">
                 <a:solidFill>
@@ -4313,14 +4296,14 @@
               <a:t>Un </a:t>
             </a:r>
             <a:r>
-              <a:rPr lang="fr-FR" dirty="0" err="1" smtClean="0">
+              <a:rPr lang="fr-FR" dirty="0" smtClean="0">
                 <a:solidFill>
                   <a:schemeClr val="bg1">
                     <a:lumMod val="50000"/>
                   </a:schemeClr>
                 </a:solidFill>
               </a:rPr>
-              <a:t>caneva</a:t>
+              <a:t>canevas </a:t>
             </a:r>
             <a:r>
               <a:rPr lang="fr-FR" dirty="0" smtClean="0">
@@ -4330,13 +4313,18 @@
                   </a:schemeClr>
                 </a:solidFill>
               </a:rPr>
-              <a:t> par utilisateur</a:t>
-            </a:r>
-          </a:p>
-          <a:p>
-            <a:pPr marL="0" indent="0">
-              <a:buNone/>
-            </a:pPr>
+              <a:t>par </a:t>
+            </a:r>
+            <a:r>
+              <a:rPr lang="fr-FR" dirty="0" smtClean="0">
+                <a:solidFill>
+                  <a:schemeClr val="bg1">
+                    <a:lumMod val="50000"/>
+                  </a:schemeClr>
+                </a:solidFill>
+              </a:rPr>
+              <a:t>utilisateur</a:t>
+            </a:r>
             <a:endParaRPr lang="fr-FR" dirty="0" smtClean="0">
               <a:solidFill>
                 <a:schemeClr val="bg1">
@@ -4346,9 +4334,6 @@
             </a:endParaRPr>
           </a:p>
           <a:p>
-            <a:pPr marL="0" indent="0">
-              <a:buNone/>
-            </a:pPr>
             <a:r>
               <a:rPr lang="fr-FR" dirty="0" smtClean="0">
                 <a:solidFill>
@@ -4357,13 +4342,18 @@
                   </a:schemeClr>
                 </a:solidFill>
               </a:rPr>
-              <a:t>Envoi de chaque point « dessiné »</a:t>
-            </a:r>
-          </a:p>
-          <a:p>
-            <a:pPr marL="0" indent="0">
-              <a:buNone/>
-            </a:pPr>
+              <a:t>Envoi de chaque point « dessiné </a:t>
+            </a:r>
+            <a:r>
+              <a:rPr lang="fr-FR" dirty="0" smtClean="0">
+                <a:solidFill>
+                  <a:schemeClr val="bg1">
+                    <a:lumMod val="50000"/>
+                  </a:schemeClr>
+                </a:solidFill>
+              </a:rPr>
+              <a:t>»</a:t>
+            </a:r>
             <a:endParaRPr lang="fr-FR" dirty="0" smtClean="0">
               <a:solidFill>
                 <a:schemeClr val="bg1">
@@ -4373,9 +4363,6 @@
             </a:endParaRPr>
           </a:p>
           <a:p>
-            <a:pPr marL="0" indent="0">
-              <a:buNone/>
-            </a:pPr>
             <a:r>
               <a:rPr lang="fr-FR" dirty="0" smtClean="0">
                 <a:solidFill>
@@ -4507,9 +4494,6 @@
           <a:bodyPr/>
           <a:lstStyle/>
           <a:p>
-            <a:pPr marL="0" indent="0">
-              <a:buNone/>
-            </a:pPr>
             <a:r>
               <a:rPr lang="fr-FR" dirty="0" smtClean="0">
                 <a:solidFill>
@@ -4518,28 +4502,49 @@
                   </a:schemeClr>
                 </a:solidFill>
               </a:rPr>
-              <a:t>Liste collaborative</a:t>
-            </a:r>
-          </a:p>
-          <a:p>
-            <a:pPr marL="0" indent="0">
-              <a:buNone/>
-            </a:pPr>
-            <a:r>
-              <a:rPr lang="fr-FR" dirty="0" smtClean="0">
+              <a:t>« </a:t>
+            </a:r>
+            <a:r>
+              <a:rPr lang="fr-FR" dirty="0" err="1" smtClean="0">
                 <a:solidFill>
                   <a:schemeClr val="bg1">
                     <a:lumMod val="50000"/>
                   </a:schemeClr>
                 </a:solidFill>
               </a:rPr>
+              <a:t>ToDo</a:t>
+            </a:r>
+            <a:r>
+              <a:rPr lang="fr-FR" dirty="0" smtClean="0">
+                <a:solidFill>
+                  <a:schemeClr val="bg1">
+                    <a:lumMod val="50000"/>
+                  </a:schemeClr>
+                </a:solidFill>
+              </a:rPr>
+              <a:t> List » collaborative</a:t>
+            </a:r>
+            <a:endParaRPr lang="fr-FR" dirty="0" smtClean="0">
+              <a:solidFill>
+                <a:schemeClr val="bg1">
+                  <a:lumMod val="50000"/>
+                </a:schemeClr>
+              </a:solidFill>
+            </a:endParaRPr>
+          </a:p>
+          <a:p>
+            <a:r>
+              <a:rPr lang="fr-FR" dirty="0" smtClean="0">
+                <a:solidFill>
+                  <a:schemeClr val="bg1">
+                    <a:lumMod val="50000"/>
+                  </a:schemeClr>
+                </a:solidFill>
+              </a:rPr>
               <a:t>Agile</a:t>
             </a:r>
           </a:p>
           <a:p>
-            <a:pPr marL="0" indent="0">
-              <a:buNone/>
-            </a:pPr>
             <a:r>
               <a:rPr lang="fr-FR" dirty="0" smtClean="0">
                 <a:solidFill>
@@ -4712,9 +4717,6 @@
           <a:bodyPr/>
           <a:lstStyle/>
           <a:p>
-            <a:pPr marL="0" indent="0">
-              <a:buNone/>
-            </a:pPr>
             <a:r>
               <a:rPr lang="fr-FR" dirty="0" smtClean="0">
                 <a:solidFill>
@@ -4723,13 +4725,30 @@
                   </a:schemeClr>
                 </a:solidFill>
               </a:rPr>
-              <a:t>Afficher les informations utile en temps réel</a:t>
-            </a:r>
-          </a:p>
-          <a:p>
-            <a:pPr marL="0" indent="0">
-              <a:buNone/>
-            </a:pPr>
+              <a:t>Afficher les informations </a:t>
+            </a:r>
+            <a:r>
+              <a:rPr lang="fr-FR" dirty="0" smtClean="0">
+                <a:solidFill>
+                  <a:schemeClr val="bg1">
+                    <a:lumMod val="50000"/>
+                  </a:schemeClr>
+                </a:solidFill>
+              </a:rPr>
+              <a:t>utiles </a:t>
+            </a:r>
+            <a:r>
+              <a:rPr lang="fr-FR" dirty="0" smtClean="0">
+                <a:solidFill>
+                  <a:schemeClr val="bg1">
+                    <a:lumMod val="50000"/>
+                  </a:schemeClr>
+                </a:solidFill>
+              </a:rPr>
+              <a:t>en temps réel</a:t>
+            </a:r>
+          </a:p>
+          <a:p>
             <a:r>
               <a:rPr lang="fr-FR" dirty="0" smtClean="0">
                 <a:solidFill>
@@ -4895,9 +4914,6 @@
           <a:bodyPr/>
           <a:lstStyle/>
           <a:p>
-            <a:pPr marL="0" indent="0">
-              <a:buNone/>
-            </a:pPr>
             <a:r>
               <a:rPr lang="fr-FR" dirty="0" smtClean="0">
                 <a:solidFill>
@@ -4910,9 +4926,6 @@
             </a:r>
           </a:p>
           <a:p>
-            <a:pPr marL="0" indent="0">
-              <a:buNone/>
-            </a:pPr>
             <a:r>
               <a:rPr lang="fr-FR" dirty="0" smtClean="0">
                 <a:solidFill>
@@ -5442,9 +5455,6 @@
           <a:bodyPr/>
           <a:lstStyle/>
           <a:p>
-            <a:pPr marL="0" indent="0">
-              <a:buNone/>
-            </a:pPr>
             <a:r>
               <a:rPr lang="fr-FR" dirty="0" smtClean="0">
                 <a:solidFill>
@@ -5457,9 +5467,6 @@
             </a:r>
           </a:p>
           <a:p>
-            <a:pPr marL="0" indent="0">
-              <a:buNone/>
-            </a:pPr>
             <a:r>
               <a:rPr lang="fr-FR" dirty="0" smtClean="0">
                 <a:solidFill>
@@ -5623,9 +5630,6 @@
           <a:bodyPr/>
           <a:lstStyle/>
           <a:p>
-            <a:pPr marL="0" indent="0">
-              <a:buNone/>
-            </a:pPr>
             <a:r>
               <a:rPr lang="fr-FR" dirty="0" smtClean="0">
                 <a:solidFill>
@@ -5634,7 +5638,55 @@
                   </a:schemeClr>
                 </a:solidFill>
               </a:rPr>
-              <a:t>Permet le travail collaboratif</a:t>
+              <a:t>Permet le travail </a:t>
+            </a:r>
+            <a:r>
+              <a:rPr lang="fr-FR" dirty="0" smtClean="0">
+                <a:solidFill>
+                  <a:schemeClr val="bg1">
+                    <a:lumMod val="50000"/>
+                  </a:schemeClr>
+                </a:solidFill>
+              </a:rPr>
+              <a:t>collaboratif</a:t>
+            </a:r>
+          </a:p>
+          <a:p>
+            <a:r>
+              <a:rPr lang="fr-FR" dirty="0" smtClean="0">
+                <a:solidFill>
+                  <a:schemeClr val="bg1">
+                    <a:lumMod val="50000"/>
+                  </a:schemeClr>
+                </a:solidFill>
+              </a:rPr>
+              <a:t>Améliorations envisageables:</a:t>
+            </a:r>
+          </a:p>
+          <a:p>
+            <a:pPr lvl="1"/>
+            <a:r>
+              <a:rPr lang="fr-FR" dirty="0" smtClean="0">
+                <a:solidFill>
+                  <a:schemeClr val="bg1">
+                    <a:lumMod val="50000"/>
+                  </a:schemeClr>
+                </a:solidFill>
+              </a:rPr>
+              <a:t>Partage de fichiers</a:t>
+            </a:r>
+          </a:p>
+          <a:p>
+            <a:pPr lvl="1"/>
+            <a:r>
+              <a:rPr lang="fr-FR" dirty="0" smtClean="0">
+                <a:solidFill>
+                  <a:schemeClr val="bg1">
+                    <a:lumMod val="50000"/>
+                  </a:schemeClr>
+                </a:solidFill>
+              </a:rPr>
+              <a:t>Vidéoconférence à + de 2 personnes</a:t>
             </a:r>
             <a:endParaRPr lang="fr-FR" dirty="0" smtClean="0">
               <a:solidFill>

</xml_diff>